<commit_message>
fixed title run off
</commit_message>
<xml_diff>
--- a/app/public/assets/img/WanderMust_Presentation.pptx
+++ b/app/public/assets/img/WanderMust_Presentation.pptx
@@ -5,7 +5,7 @@
     <p:sldMasterId id="2147483660" r:id="rId1"/>
   </p:sldMasterIdLst>
   <p:notesMasterIdLst>
-    <p:notesMasterId r:id="rId15"/>
+    <p:notesMasterId r:id="rId18"/>
   </p:notesMasterIdLst>
   <p:sldIdLst>
     <p:sldId id="256" r:id="rId2"/>
@@ -17,10 +17,13 @@
     <p:sldId id="267" r:id="rId8"/>
     <p:sldId id="268" r:id="rId9"/>
     <p:sldId id="270" r:id="rId10"/>
-    <p:sldId id="272" r:id="rId11"/>
-    <p:sldId id="274" r:id="rId12"/>
-    <p:sldId id="271" r:id="rId13"/>
-    <p:sldId id="273" r:id="rId14"/>
+    <p:sldId id="277" r:id="rId11"/>
+    <p:sldId id="276" r:id="rId12"/>
+    <p:sldId id="272" r:id="rId13"/>
+    <p:sldId id="274" r:id="rId14"/>
+    <p:sldId id="275" r:id="rId15"/>
+    <p:sldId id="271" r:id="rId16"/>
+    <p:sldId id="273" r:id="rId17"/>
   </p:sldIdLst>
   <p:sldSz cx="9144000" cy="5143500" type="screen16x9"/>
   <p:notesSz cx="6858000" cy="9144000"/>
@@ -537,7 +540,7 @@
           <a:p>
             <a:fld id="{5FDCFD46-FF20-D845-B1AA-938B28A45DF3}" type="slidenum">
               <a:rPr lang="en-US" smtClean="0"/>
-              <a:t>10</a:t>
+              <a:t>12</a:t>
             </a:fld>
             <a:endParaRPr lang="en-US"/>
           </a:p>
@@ -5336,6 +5339,416 @@
           <a:chExt cx="0" cy="0"/>
         </a:xfrm>
       </p:grpSpPr>
+      <p:pic>
+        <p:nvPicPr>
+          <p:cNvPr id="9" name="Picture 8" descr="AA039185.png"/>
+          <p:cNvPicPr>
+            <a:picLocks noChangeAspect="1"/>
+          </p:cNvPicPr>
+          <p:nvPr/>
+        </p:nvPicPr>
+        <p:blipFill>
+          <a:blip r:embed="rId2">
+            <a:extLst>
+              <a:ext uri="{28A0092B-C50C-407E-A947-70E740481C1C}">
+                <a14:useLocalDpi xmlns:a14="http://schemas.microsoft.com/office/drawing/2010/main" val="0"/>
+              </a:ext>
+            </a:extLst>
+          </a:blip>
+          <a:stretch>
+            <a:fillRect/>
+          </a:stretch>
+        </p:blipFill>
+        <p:spPr>
+          <a:xfrm>
+            <a:off x="692440" y="157182"/>
+            <a:ext cx="2945847" cy="2551724"/>
+          </a:xfrm>
+          <a:prstGeom prst="rect">
+            <a:avLst/>
+          </a:prstGeom>
+        </p:spPr>
+      </p:pic>
+      <p:sp>
+        <p:nvSpPr>
+          <p:cNvPr id="10" name="Title 1"/>
+          <p:cNvSpPr txBox="1">
+            <a:spLocks/>
+          </p:cNvSpPr>
+          <p:nvPr/>
+        </p:nvSpPr>
+        <p:spPr>
+          <a:xfrm>
+            <a:off x="746869" y="1217157"/>
+            <a:ext cx="2776801" cy="578043"/>
+          </a:xfrm>
+          <a:prstGeom prst="rect">
+            <a:avLst/>
+          </a:prstGeom>
+        </p:spPr>
+        <p:txBody>
+          <a:bodyPr vert="horz" lIns="91440" tIns="45720" rIns="91440" bIns="45720" rtlCol="0" anchor="ctr">
+            <a:noAutofit/>
+          </a:bodyPr>
+          <a:lstStyle>
+            <a:lvl1pPr algn="l" defTabSz="914400" rtl="0" eaLnBrk="1" latinLnBrk="0" hangingPunct="1">
+              <a:spcBef>
+                <a:spcPct val="0"/>
+              </a:spcBef>
+              <a:buNone/>
+              <a:defRPr sz="2800" kern="1200" cap="all" baseline="0">
+                <a:solidFill>
+                  <a:schemeClr val="tx1"/>
+                </a:solidFill>
+                <a:latin typeface="+mj-lt"/>
+                <a:ea typeface="+mj-ea"/>
+                <a:cs typeface="+mj-cs"/>
+              </a:defRPr>
+            </a:lvl1pPr>
+          </a:lstStyle>
+          <a:p>
+            <a:pPr algn="ctr"/>
+            <a:r>
+              <a:rPr lang="en-US" sz="4000" dirty="0" smtClean="0">
+                <a:solidFill>
+                  <a:schemeClr val="bg1"/>
+                </a:solidFill>
+              </a:rPr>
+              <a:t>Packing</a:t>
+            </a:r>
+            <a:endParaRPr lang="en-US" sz="4000" dirty="0">
+              <a:solidFill>
+                <a:schemeClr val="bg1"/>
+              </a:solidFill>
+            </a:endParaRPr>
+          </a:p>
+        </p:txBody>
+      </p:sp>
+      <p:pic>
+        <p:nvPicPr>
+          <p:cNvPr id="2" name="Picture 1" descr="download.jpg"/>
+          <p:cNvPicPr>
+            <a:picLocks noChangeAspect="1"/>
+          </p:cNvPicPr>
+          <p:nvPr/>
+        </p:nvPicPr>
+        <p:blipFill>
+          <a:blip r:embed="rId3">
+            <a:extLst>
+              <a:ext uri="{28A0092B-C50C-407E-A947-70E740481C1C}">
+                <a14:useLocalDpi xmlns:a14="http://schemas.microsoft.com/office/drawing/2010/main" val="0"/>
+              </a:ext>
+            </a:extLst>
+          </a:blip>
+          <a:stretch>
+            <a:fillRect/>
+          </a:stretch>
+        </p:blipFill>
+        <p:spPr>
+          <a:xfrm>
+            <a:off x="4108824" y="238244"/>
+            <a:ext cx="4684177" cy="4684177"/>
+          </a:xfrm>
+          <a:prstGeom prst="rect">
+            <a:avLst/>
+          </a:prstGeom>
+        </p:spPr>
+      </p:pic>
+    </p:spTree>
+    <p:extLst>
+      <p:ext uri="{BB962C8B-B14F-4D97-AF65-F5344CB8AC3E}">
+        <p14:creationId xmlns:p14="http://schemas.microsoft.com/office/powerpoint/2010/main" val="2781443474"/>
+      </p:ext>
+    </p:extLst>
+  </p:cSld>
+  <p:clrMapOvr>
+    <a:masterClrMapping/>
+  </p:clrMapOvr>
+  <p:timing>
+    <p:tnLst>
+      <p:par>
+        <p:cTn xmlns:p14="http://schemas.microsoft.com/office/powerpoint/2010/main" id="1" dur="indefinite" restart="never" nodeType="tmRoot">
+          <p:childTnLst>
+            <p:seq concurrent="1" nextAc="seek">
+              <p:cTn id="2" dur="indefinite" nodeType="mainSeq">
+                <p:childTnLst>
+                  <p:par>
+                    <p:cTn id="3" fill="hold">
+                      <p:stCondLst>
+                        <p:cond delay="indefinite"/>
+                      </p:stCondLst>
+                      <p:childTnLst>
+                        <p:par>
+                          <p:cTn id="4" fill="hold">
+                            <p:stCondLst>
+                              <p:cond delay="0"/>
+                            </p:stCondLst>
+                            <p:childTnLst>
+                              <p:par>
+                                <p:cTn id="5" presetID="1" presetClass="entr" presetSubtype="0" fill="hold" nodeType="clickEffect">
+                                  <p:stCondLst>
+                                    <p:cond delay="0"/>
+                                  </p:stCondLst>
+                                  <p:childTnLst>
+                                    <p:set>
+                                      <p:cBhvr>
+                                        <p:cTn id="6" dur="1" fill="hold">
+                                          <p:stCondLst>
+                                            <p:cond delay="0"/>
+                                          </p:stCondLst>
+                                        </p:cTn>
+                                        <p:tgtEl>
+                                          <p:spTgt spid="2"/>
+                                        </p:tgtEl>
+                                        <p:attrNameLst>
+                                          <p:attrName>style.visibility</p:attrName>
+                                        </p:attrNameLst>
+                                      </p:cBhvr>
+                                      <p:to>
+                                        <p:strVal val="visible"/>
+                                      </p:to>
+                                    </p:set>
+                                  </p:childTnLst>
+                                </p:cTn>
+                              </p:par>
+                            </p:childTnLst>
+                          </p:cTn>
+                        </p:par>
+                      </p:childTnLst>
+                    </p:cTn>
+                  </p:par>
+                </p:childTnLst>
+              </p:cTn>
+              <p:prevCondLst>
+                <p:cond evt="onPrev" delay="0">
+                  <p:tgtEl>
+                    <p:sldTgt/>
+                  </p:tgtEl>
+                </p:cond>
+              </p:prevCondLst>
+              <p:nextCondLst>
+                <p:cond evt="onNext" delay="0">
+                  <p:tgtEl>
+                    <p:sldTgt/>
+                  </p:tgtEl>
+                </p:cond>
+              </p:nextCondLst>
+            </p:seq>
+          </p:childTnLst>
+        </p:cTn>
+      </p:par>
+    </p:tnLst>
+  </p:timing>
+</p:sld>
+</file>
+
+<file path=ppt/slides/slide11.xml><?xml version="1.0" encoding="utf-8"?>
+<p:sld xmlns:a="http://schemas.openxmlformats.org/drawingml/2006/main" xmlns:r="http://schemas.openxmlformats.org/officeDocument/2006/relationships" xmlns:p="http://schemas.openxmlformats.org/presentationml/2006/main">
+  <p:cSld>
+    <p:spTree>
+      <p:nvGrpSpPr>
+        <p:cNvPr id="1" name=""/>
+        <p:cNvGrpSpPr/>
+        <p:nvPr/>
+      </p:nvGrpSpPr>
+      <p:grpSpPr>
+        <a:xfrm>
+          <a:off x="0" y="0"/>
+          <a:ext cx="0" cy="0"/>
+          <a:chOff x="0" y="0"/>
+          <a:chExt cx="0" cy="0"/>
+        </a:xfrm>
+      </p:grpSpPr>
+      <p:sp>
+        <p:nvSpPr>
+          <p:cNvPr id="4" name="Title 3"/>
+          <p:cNvSpPr>
+            <a:spLocks noGrp="1"/>
+          </p:cNvSpPr>
+          <p:nvPr>
+            <p:ph type="title"/>
+          </p:nvPr>
+        </p:nvSpPr>
+        <p:spPr>
+          <a:xfrm>
+            <a:off x="191869" y="114700"/>
+            <a:ext cx="5650992" cy="905632"/>
+          </a:xfrm>
+        </p:spPr>
+        <p:txBody>
+          <a:bodyPr/>
+          <a:lstStyle/>
+          <a:p>
+            <a:r>
+              <a:rPr lang="en-US" sz="6000" dirty="0" smtClean="0">
+                <a:solidFill>
+                  <a:schemeClr val="tx1">
+                    <a:lumMod val="75000"/>
+                    <a:lumOff val="25000"/>
+                  </a:schemeClr>
+                </a:solidFill>
+              </a:rPr>
+              <a:t>HTML vs. API</a:t>
+            </a:r>
+            <a:endParaRPr lang="en-US" sz="6000" dirty="0">
+              <a:solidFill>
+                <a:schemeClr val="tx1">
+                  <a:lumMod val="75000"/>
+                  <a:lumOff val="25000"/>
+                </a:schemeClr>
+              </a:solidFill>
+            </a:endParaRPr>
+          </a:p>
+        </p:txBody>
+      </p:sp>
+      <p:sp>
+        <p:nvSpPr>
+          <p:cNvPr id="5" name="TextBox 4"/>
+          <p:cNvSpPr txBox="1"/>
+          <p:nvPr/>
+        </p:nvSpPr>
+        <p:spPr>
+          <a:xfrm rot="19576794">
+            <a:off x="2115472" y="1668070"/>
+            <a:ext cx="6068914" cy="646331"/>
+          </a:xfrm>
+          <a:prstGeom prst="rect">
+            <a:avLst/>
+          </a:prstGeom>
+          <a:noFill/>
+        </p:spPr>
+        <p:txBody>
+          <a:bodyPr wrap="square" rtlCol="0">
+            <a:spAutoFit/>
+          </a:bodyPr>
+          <a:lstStyle/>
+          <a:p>
+            <a:pPr algn="r"/>
+            <a:r>
+              <a:rPr lang="en-US" sz="3600" dirty="0" smtClean="0">
+                <a:solidFill>
+                  <a:srgbClr val="FFFFFF"/>
+                </a:solidFill>
+              </a:rPr>
+              <a:t>DATABASE CALLS AF</a:t>
+            </a:r>
+            <a:endParaRPr lang="en-US" sz="3600" dirty="0">
+              <a:solidFill>
+                <a:srgbClr val="FFFFFF"/>
+              </a:solidFill>
+            </a:endParaRPr>
+          </a:p>
+        </p:txBody>
+      </p:sp>
+      <p:sp>
+        <p:nvSpPr>
+          <p:cNvPr id="6" name="TextBox 5"/>
+          <p:cNvSpPr txBox="1"/>
+          <p:nvPr/>
+        </p:nvSpPr>
+        <p:spPr>
+          <a:xfrm rot="19574347">
+            <a:off x="1639361" y="1444119"/>
+            <a:ext cx="4231712" cy="1323439"/>
+          </a:xfrm>
+          <a:prstGeom prst="rect">
+            <a:avLst/>
+          </a:prstGeom>
+          <a:noFill/>
+        </p:spPr>
+        <p:txBody>
+          <a:bodyPr wrap="square" rtlCol="0">
+            <a:spAutoFit/>
+          </a:bodyPr>
+          <a:lstStyle/>
+          <a:p>
+            <a:r>
+              <a:rPr lang="en-US" sz="8000" dirty="0" smtClean="0">
+                <a:solidFill>
+                  <a:srgbClr val="331933"/>
+                </a:solidFill>
+                <a:latin typeface="SignPainter-HouseScript"/>
+                <a:cs typeface="SignPainter-HouseScript"/>
+              </a:rPr>
+              <a:t>Routes</a:t>
+            </a:r>
+            <a:endParaRPr lang="en-US" sz="8000" dirty="0">
+              <a:solidFill>
+                <a:srgbClr val="331933"/>
+              </a:solidFill>
+              <a:latin typeface="SignPainter-HouseScript"/>
+              <a:cs typeface="SignPainter-HouseScript"/>
+            </a:endParaRPr>
+          </a:p>
+        </p:txBody>
+      </p:sp>
+      <p:pic>
+        <p:nvPicPr>
+          <p:cNvPr id="7" name="Picture 6" descr="2609f530815021.5605877c9d00e.png"/>
+          <p:cNvPicPr>
+            <a:picLocks noChangeAspect="1"/>
+          </p:cNvPicPr>
+          <p:nvPr/>
+        </p:nvPicPr>
+        <p:blipFill>
+          <a:blip r:embed="rId2">
+            <a:extLst>
+              <a:ext uri="{28A0092B-C50C-407E-A947-70E740481C1C}">
+                <a14:useLocalDpi xmlns:a14="http://schemas.microsoft.com/office/drawing/2010/main" val="0"/>
+              </a:ext>
+            </a:extLst>
+          </a:blip>
+          <a:stretch>
+            <a:fillRect/>
+          </a:stretch>
+        </p:blipFill>
+        <p:spPr>
+          <a:xfrm>
+            <a:off x="5458322" y="1867648"/>
+            <a:ext cx="3640854" cy="3216088"/>
+          </a:xfrm>
+          <a:prstGeom prst="rect">
+            <a:avLst/>
+          </a:prstGeom>
+        </p:spPr>
+      </p:pic>
+    </p:spTree>
+    <p:extLst>
+      <p:ext uri="{BB962C8B-B14F-4D97-AF65-F5344CB8AC3E}">
+        <p14:creationId xmlns:p14="http://schemas.microsoft.com/office/powerpoint/2010/main" val="4171139921"/>
+      </p:ext>
+    </p:extLst>
+  </p:cSld>
+  <p:clrMapOvr>
+    <a:masterClrMapping/>
+  </p:clrMapOvr>
+  <p:timing>
+    <p:tnLst>
+      <p:par>
+        <p:cTn xmlns:p14="http://schemas.microsoft.com/office/powerpoint/2010/main" id="1" dur="indefinite" restart="never" nodeType="tmRoot"/>
+      </p:par>
+    </p:tnLst>
+  </p:timing>
+</p:sld>
+</file>
+
+<file path=ppt/slides/slide12.xml><?xml version="1.0" encoding="utf-8"?>
+<p:sld xmlns:a="http://schemas.openxmlformats.org/drawingml/2006/main" xmlns:r="http://schemas.openxmlformats.org/officeDocument/2006/relationships" xmlns:p="http://schemas.openxmlformats.org/presentationml/2006/main">
+  <p:cSld>
+    <p:spTree>
+      <p:nvGrpSpPr>
+        <p:cNvPr id="1" name=""/>
+        <p:cNvGrpSpPr/>
+        <p:nvPr/>
+      </p:nvGrpSpPr>
+      <p:grpSpPr>
+        <a:xfrm>
+          <a:off x="0" y="0"/>
+          <a:ext cx="0" cy="0"/>
+          <a:chOff x="0" y="0"/>
+          <a:chExt cx="0" cy="0"/>
+        </a:xfrm>
+      </p:grpSpPr>
       <p:sp>
         <p:nvSpPr>
           <p:cNvPr id="2" name="Title 1"/>
@@ -5566,7 +5979,7 @@
 </p:sld>
 </file>
 
-<file path=ppt/slides/slide11.xml><?xml version="1.0" encoding="utf-8"?>
+<file path=ppt/slides/slide13.xml><?xml version="1.0" encoding="utf-8"?>
 <p:sld xmlns:a="http://schemas.openxmlformats.org/drawingml/2006/main" xmlns:r="http://schemas.openxmlformats.org/officeDocument/2006/relationships" xmlns:p="http://schemas.openxmlformats.org/presentationml/2006/main">
   <p:cSld>
     <p:spTree>
@@ -5608,51 +6021,6 @@
       </p:sp>
       <p:sp>
         <p:nvSpPr>
-          <p:cNvPr id="3" name="Text Placeholder 2"/>
-          <p:cNvSpPr>
-            <a:spLocks noGrp="1"/>
-          </p:cNvSpPr>
-          <p:nvPr>
-            <p:ph type="body" idx="1"/>
-          </p:nvPr>
-        </p:nvSpPr>
-        <p:spPr/>
-        <p:txBody>
-          <a:bodyPr/>
-          <a:lstStyle/>
-          <a:p>
-            <a:r>
-              <a:rPr lang="en-US" dirty="0" err="1" smtClean="0"/>
-              <a:t>Pixabay</a:t>
-            </a:r>
-            <a:endParaRPr lang="en-US" dirty="0"/>
-          </a:p>
-        </p:txBody>
-      </p:sp>
-      <p:pic>
-        <p:nvPicPr>
-          <p:cNvPr id="7" name="Content Placeholder 6"/>
-          <p:cNvPicPr>
-            <a:picLocks noGrp="1" noChangeAspect="1"/>
-          </p:cNvPicPr>
-          <p:nvPr>
-            <p:ph sz="half" idx="2"/>
-          </p:nvPr>
-        </p:nvPicPr>
-        <p:blipFill rotWithShape="1">
-          <a:blip r:embed="rId2"/>
-          <a:srcRect l="-128" t="7756" r="-7251" b="4616"/>
-          <a:stretch/>
-        </p:blipFill>
-        <p:spPr>
-          <a:xfrm>
-            <a:off x="819150" y="1276385"/>
-            <a:ext cx="3200400" cy="2510524"/>
-          </a:xfrm>
-        </p:spPr>
-      </p:pic>
-      <p:sp>
-        <p:nvSpPr>
           <p:cNvPr id="5" name="Text Placeholder 4"/>
           <p:cNvSpPr>
             <a:spLocks noGrp="1"/>
@@ -5661,7 +6029,12 @@
             <p:ph type="body" sz="quarter" idx="3"/>
           </p:nvPr>
         </p:nvSpPr>
-        <p:spPr/>
+        <p:spPr>
+          <a:xfrm>
+            <a:off x="819150" y="822960"/>
+            <a:ext cx="3200400" cy="411480"/>
+          </a:xfrm>
+        </p:spPr>
         <p:txBody>
           <a:bodyPr/>
           <a:lstStyle/>
@@ -5685,12 +6058,109 @@
           </p:nvPr>
         </p:nvPicPr>
         <p:blipFill rotWithShape="1">
-          <a:blip r:embed="rId3"/>
+          <a:blip r:embed="rId2"/>
           <a:srcRect l="16751" r="15558" b="12263"/>
           <a:stretch/>
         </p:blipFill>
-        <p:spPr/>
+        <p:spPr>
+          <a:xfrm>
+            <a:off x="819150" y="1455189"/>
+            <a:ext cx="3200400" cy="2331720"/>
+          </a:xfrm>
+        </p:spPr>
       </p:pic>
+      <p:sp>
+        <p:nvSpPr>
+          <p:cNvPr id="9" name="Content Placeholder 8"/>
+          <p:cNvSpPr>
+            <a:spLocks noGrp="1"/>
+          </p:cNvSpPr>
+          <p:nvPr>
+            <p:ph sz="half" idx="2"/>
+          </p:nvPr>
+        </p:nvSpPr>
+        <p:spPr>
+          <a:xfrm>
+            <a:off x="4857078" y="1277581"/>
+            <a:ext cx="3200400" cy="2331720"/>
+          </a:xfrm>
+        </p:spPr>
+        <p:txBody>
+          <a:bodyPr/>
+          <a:lstStyle/>
+          <a:p>
+            <a:r>
+              <a:rPr lang="en-US" dirty="0" smtClean="0"/>
+              <a:t>Give them the high and low temperatures!</a:t>
+            </a:r>
+            <a:endParaRPr lang="en-US" dirty="0"/>
+          </a:p>
+        </p:txBody>
+      </p:sp>
+      <p:pic>
+        <p:nvPicPr>
+          <p:cNvPr id="11" name="Content Placeholder 7"/>
+          <p:cNvPicPr>
+            <a:picLocks noChangeAspect="1"/>
+          </p:cNvPicPr>
+          <p:nvPr/>
+        </p:nvPicPr>
+        <p:blipFill rotWithShape="1">
+          <a:blip r:embed="rId2"/>
+          <a:srcRect l="19715" t="57015" r="18704" b="23833"/>
+          <a:stretch/>
+        </p:blipFill>
+        <p:spPr>
+          <a:xfrm>
+            <a:off x="4198471" y="2213473"/>
+            <a:ext cx="4354606" cy="761302"/>
+          </a:xfrm>
+          <a:prstGeom prst="rect">
+            <a:avLst/>
+          </a:prstGeom>
+          <a:ln>
+            <a:solidFill>
+              <a:schemeClr val="tx1"/>
+            </a:solidFill>
+          </a:ln>
+        </p:spPr>
+      </p:pic>
+      <p:cxnSp>
+        <p:nvCxnSpPr>
+          <p:cNvPr id="13" name="Straight Arrow Connector 12"/>
+          <p:cNvCxnSpPr/>
+          <p:nvPr/>
+        </p:nvCxnSpPr>
+        <p:spPr>
+          <a:xfrm flipH="1">
+            <a:off x="4019550" y="2974775"/>
+            <a:ext cx="2479862" cy="357107"/>
+          </a:xfrm>
+          <a:prstGeom prst="straightConnector1">
+            <a:avLst/>
+          </a:prstGeom>
+          <a:ln w="6350" cmpd="sng">
+            <a:solidFill>
+              <a:srgbClr val="000000"/>
+            </a:solidFill>
+            <a:tailEnd type="arrow"/>
+          </a:ln>
+        </p:spPr>
+        <p:style>
+          <a:lnRef idx="2">
+            <a:schemeClr val="accent1"/>
+          </a:lnRef>
+          <a:fillRef idx="0">
+            <a:schemeClr val="accent1"/>
+          </a:fillRef>
+          <a:effectRef idx="1">
+            <a:schemeClr val="accent1"/>
+          </a:effectRef>
+          <a:fontRef idx="minor">
+            <a:schemeClr val="tx1"/>
+          </a:fontRef>
+        </p:style>
+      </p:cxnSp>
     </p:spTree>
     <p:extLst>
       <p:ext uri="{BB962C8B-B14F-4D97-AF65-F5344CB8AC3E}">
@@ -5711,7 +6181,237 @@
 </p:sld>
 </file>
 
-<file path=ppt/slides/slide12.xml><?xml version="1.0" encoding="utf-8"?>
+<file path=ppt/slides/slide14.xml><?xml version="1.0" encoding="utf-8"?>
+<p:sld xmlns:a="http://schemas.openxmlformats.org/drawingml/2006/main" xmlns:r="http://schemas.openxmlformats.org/officeDocument/2006/relationships" xmlns:p="http://schemas.openxmlformats.org/presentationml/2006/main">
+  <p:cSld>
+    <p:spTree>
+      <p:nvGrpSpPr>
+        <p:cNvPr id="1" name=""/>
+        <p:cNvGrpSpPr/>
+        <p:nvPr/>
+      </p:nvGrpSpPr>
+      <p:grpSpPr>
+        <a:xfrm>
+          <a:off x="0" y="0"/>
+          <a:ext cx="0" cy="0"/>
+          <a:chOff x="0" y="0"/>
+          <a:chExt cx="0" cy="0"/>
+        </a:xfrm>
+      </p:grpSpPr>
+      <p:sp>
+        <p:nvSpPr>
+          <p:cNvPr id="2" name="Title 1"/>
+          <p:cNvSpPr>
+            <a:spLocks noGrp="1"/>
+          </p:cNvSpPr>
+          <p:nvPr>
+            <p:ph type="title"/>
+          </p:nvPr>
+        </p:nvSpPr>
+        <p:spPr/>
+        <p:txBody>
+          <a:bodyPr/>
+          <a:lstStyle/>
+          <a:p>
+            <a:r>
+              <a:rPr lang="en-US" dirty="0" smtClean="0"/>
+              <a:t>API’s for user experience</a:t>
+            </a:r>
+            <a:endParaRPr lang="en-US" dirty="0"/>
+          </a:p>
+        </p:txBody>
+      </p:sp>
+      <p:sp>
+        <p:nvSpPr>
+          <p:cNvPr id="3" name="Text Placeholder 2"/>
+          <p:cNvSpPr>
+            <a:spLocks noGrp="1"/>
+          </p:cNvSpPr>
+          <p:nvPr>
+            <p:ph type="body" idx="1"/>
+          </p:nvPr>
+        </p:nvSpPr>
+        <p:spPr>
+          <a:xfrm>
+            <a:off x="822960" y="722155"/>
+            <a:ext cx="3200400" cy="411480"/>
+          </a:xfrm>
+        </p:spPr>
+        <p:txBody>
+          <a:bodyPr/>
+          <a:lstStyle/>
+          <a:p>
+            <a:r>
+              <a:rPr lang="en-US" dirty="0" err="1" smtClean="0"/>
+              <a:t>Pixabay</a:t>
+            </a:r>
+            <a:endParaRPr lang="en-US" dirty="0"/>
+          </a:p>
+        </p:txBody>
+      </p:sp>
+      <p:pic>
+        <p:nvPicPr>
+          <p:cNvPr id="7" name="Content Placeholder 6"/>
+          <p:cNvPicPr>
+            <a:picLocks noGrp="1" noChangeAspect="1"/>
+          </p:cNvPicPr>
+          <p:nvPr>
+            <p:ph sz="half" idx="2"/>
+          </p:nvPr>
+        </p:nvPicPr>
+        <p:blipFill rotWithShape="1">
+          <a:blip r:embed="rId2"/>
+          <a:srcRect l="-128" t="7756" r="-7251" b="4616"/>
+          <a:stretch/>
+        </p:blipFill>
+        <p:spPr>
+          <a:xfrm>
+            <a:off x="120623" y="1234440"/>
+            <a:ext cx="3253871" cy="2552469"/>
+          </a:xfrm>
+        </p:spPr>
+      </p:pic>
+      <p:pic>
+        <p:nvPicPr>
+          <p:cNvPr id="9" name="Picture 8"/>
+          <p:cNvPicPr>
+            <a:picLocks noChangeAspect="1"/>
+          </p:cNvPicPr>
+          <p:nvPr/>
+        </p:nvPicPr>
+        <p:blipFill rotWithShape="1">
+          <a:blip r:embed="rId3"/>
+          <a:srcRect t="9254" b="4152"/>
+          <a:stretch/>
+        </p:blipFill>
+        <p:spPr>
+          <a:xfrm>
+            <a:off x="3090238" y="1220829"/>
+            <a:ext cx="3059206" cy="2566080"/>
+          </a:xfrm>
+          <a:prstGeom prst="rect">
+            <a:avLst/>
+          </a:prstGeom>
+        </p:spPr>
+      </p:pic>
+      <p:pic>
+        <p:nvPicPr>
+          <p:cNvPr id="12" name="Picture 11"/>
+          <p:cNvPicPr>
+            <a:picLocks noChangeAspect="1"/>
+          </p:cNvPicPr>
+          <p:nvPr/>
+        </p:nvPicPr>
+        <p:blipFill>
+          <a:blip r:embed="rId4"/>
+          <a:stretch>
+            <a:fillRect/>
+          </a:stretch>
+        </p:blipFill>
+        <p:spPr>
+          <a:xfrm>
+            <a:off x="6028356" y="1148912"/>
+            <a:ext cx="3014854" cy="2637997"/>
+          </a:xfrm>
+          <a:prstGeom prst="rect">
+            <a:avLst/>
+          </a:prstGeom>
+        </p:spPr>
+      </p:pic>
+      <p:sp>
+        <p:nvSpPr>
+          <p:cNvPr id="13" name="TextBox 12"/>
+          <p:cNvSpPr txBox="1"/>
+          <p:nvPr/>
+        </p:nvSpPr>
+        <p:spPr>
+          <a:xfrm>
+            <a:off x="4196214" y="4454367"/>
+            <a:ext cx="4765682" cy="646331"/>
+          </a:xfrm>
+          <a:prstGeom prst="rect">
+            <a:avLst/>
+          </a:prstGeom>
+          <a:noFill/>
+        </p:spPr>
+        <p:txBody>
+          <a:bodyPr wrap="square" rtlCol="0">
+            <a:spAutoFit/>
+          </a:bodyPr>
+          <a:lstStyle/>
+          <a:p>
+            <a:pPr algn="r"/>
+            <a:r>
+              <a:rPr lang="en-US" sz="3600" dirty="0" smtClean="0">
+                <a:solidFill>
+                  <a:srgbClr val="FFFFFF"/>
+                </a:solidFill>
+                <a:latin typeface="SignPainter-HouseScript"/>
+                <a:cs typeface="SignPainter-HouseScript"/>
+              </a:rPr>
+              <a:t>So </a:t>
+            </a:r>
+            <a:r>
+              <a:rPr lang="en-US" sz="3600" dirty="0" err="1" smtClean="0">
+                <a:solidFill>
+                  <a:srgbClr val="FFFFFF"/>
+                </a:solidFill>
+                <a:latin typeface="SignPainter-HouseScript"/>
+                <a:cs typeface="SignPainter-HouseScript"/>
+              </a:rPr>
+              <a:t>pretttttttyyyyyy</a:t>
+            </a:r>
+            <a:r>
+              <a:rPr lang="mr-IN" sz="3600" dirty="0" smtClean="0">
+                <a:solidFill>
+                  <a:srgbClr val="FFFFFF"/>
+                </a:solidFill>
+                <a:latin typeface="SignPainter-HouseScript"/>
+                <a:cs typeface="SignPainter-HouseScript"/>
+              </a:rPr>
+              <a:t>…</a:t>
+            </a:r>
+            <a:r>
+              <a:rPr lang="en-US" sz="3600" dirty="0" smtClean="0">
+                <a:solidFill>
+                  <a:srgbClr val="FFFFFF"/>
+                </a:solidFill>
+                <a:latin typeface="SignPainter-HouseScript"/>
+                <a:cs typeface="SignPainter-HouseScript"/>
+              </a:rPr>
+              <a:t>.</a:t>
+            </a:r>
+            <a:endParaRPr lang="en-US" sz="3600" dirty="0">
+              <a:solidFill>
+                <a:srgbClr val="FFFFFF"/>
+              </a:solidFill>
+              <a:latin typeface="SignPainter-HouseScript"/>
+              <a:cs typeface="SignPainter-HouseScript"/>
+            </a:endParaRPr>
+          </a:p>
+        </p:txBody>
+      </p:sp>
+    </p:spTree>
+    <p:extLst>
+      <p:ext uri="{BB962C8B-B14F-4D97-AF65-F5344CB8AC3E}">
+        <p14:creationId xmlns:p14="http://schemas.microsoft.com/office/powerpoint/2010/main" val="4222207518"/>
+      </p:ext>
+    </p:extLst>
+  </p:cSld>
+  <p:clrMapOvr>
+    <a:masterClrMapping/>
+  </p:clrMapOvr>
+  <p:timing>
+    <p:tnLst>
+      <p:par>
+        <p:cTn xmlns:p14="http://schemas.microsoft.com/office/powerpoint/2010/main" id="1" dur="indefinite" restart="never" nodeType="tmRoot"/>
+      </p:par>
+    </p:tnLst>
+  </p:timing>
+</p:sld>
+</file>
+
+<file path=ppt/slides/slide15.xml><?xml version="1.0" encoding="utf-8"?>
 <p:sld xmlns:a="http://schemas.openxmlformats.org/drawingml/2006/main" xmlns:r="http://schemas.openxmlformats.org/officeDocument/2006/relationships" xmlns:p="http://schemas.openxmlformats.org/presentationml/2006/main">
   <p:cSld>
     <p:spTree>
@@ -6055,7 +6755,7 @@
 </p:sld>
 </file>
 
-<file path=ppt/slides/slide13.xml><?xml version="1.0" encoding="utf-8"?>
+<file path=ppt/slides/slide16.xml><?xml version="1.0" encoding="utf-8"?>
 <p:sld xmlns:a="http://schemas.openxmlformats.org/drawingml/2006/main" xmlns:r="http://schemas.openxmlformats.org/officeDocument/2006/relationships" xmlns:p="http://schemas.openxmlformats.org/presentationml/2006/main">
   <p:cSld>
     <p:spTree>
@@ -6254,6 +6954,13 @@
   <p:clrMapOvr>
     <a:masterClrMapping/>
   </p:clrMapOvr>
+  <p:timing>
+    <p:tnLst>
+      <p:par>
+        <p:cTn xmlns:p14="http://schemas.microsoft.com/office/powerpoint/2010/main" id="1" dur="indefinite" restart="never" nodeType="tmRoot"/>
+      </p:par>
+    </p:tnLst>
+  </p:timing>
 </p:sld>
 </file>
 
@@ -7660,8 +8367,8 @@
         </p:nvSpPr>
         <p:spPr>
           <a:xfrm>
-            <a:off x="2862530" y="2894368"/>
-            <a:ext cx="6068914" cy="1415772"/>
+            <a:off x="3176710" y="2585378"/>
+            <a:ext cx="5754733" cy="1785104"/>
           </a:xfrm>
           <a:prstGeom prst="rect">
             <a:avLst/>
@@ -7711,6 +8418,15 @@
           </a:p>
           <a:p>
             <a:pPr algn="r"/>
+            <a:endParaRPr lang="en-US" sz="2400" dirty="0" smtClean="0">
+              <a:solidFill>
+                <a:schemeClr val="accent1">
+                  <a:lumMod val="50000"/>
+                </a:schemeClr>
+              </a:solidFill>
+            </a:endParaRPr>
+          </a:p>
+          <a:p>
             <a:r>
               <a:rPr lang="en-US" sz="2400" dirty="0" smtClean="0">
                 <a:solidFill>
@@ -7763,6 +8479,48 @@
                 <a:cs typeface="SignPainter-HouseScript"/>
               </a:rPr>
               <a:t>Associate</a:t>
+            </a:r>
+            <a:endParaRPr lang="en-US" sz="5400" dirty="0">
+              <a:solidFill>
+                <a:srgbClr val="331933"/>
+              </a:solidFill>
+              <a:latin typeface="SignPainter-HouseScript"/>
+              <a:cs typeface="SignPainter-HouseScript"/>
+            </a:endParaRPr>
+          </a:p>
+        </p:txBody>
+      </p:sp>
+      <p:sp>
+        <p:nvSpPr>
+          <p:cNvPr id="7" name="TextBox 6"/>
+          <p:cNvSpPr txBox="1"/>
+          <p:nvPr/>
+        </p:nvSpPr>
+        <p:spPr>
+          <a:xfrm>
+            <a:off x="3176711" y="3037217"/>
+            <a:ext cx="4231712" cy="923330"/>
+          </a:xfrm>
+          <a:prstGeom prst="rect">
+            <a:avLst/>
+          </a:prstGeom>
+          <a:noFill/>
+        </p:spPr>
+        <p:txBody>
+          <a:bodyPr wrap="square" rtlCol="0">
+            <a:spAutoFit/>
+          </a:bodyPr>
+          <a:lstStyle/>
+          <a:p>
+            <a:r>
+              <a:rPr lang="en-US" sz="5400" dirty="0" smtClean="0">
+                <a:solidFill>
+                  <a:srgbClr val="331933"/>
+                </a:solidFill>
+                <a:latin typeface="SignPainter-HouseScript"/>
+                <a:cs typeface="SignPainter-HouseScript"/>
+              </a:rPr>
+              <a:t>Routes</a:t>
             </a:r>
             <a:endParaRPr lang="en-US" sz="5400" dirty="0">
               <a:solidFill>
@@ -8024,7 +8782,6 @@
             </a:endParaRPr>
           </a:p>
           <a:p>
-            <a:pPr algn="r"/>
             <a:r>
               <a:rPr lang="en-US" sz="2400" dirty="0" smtClean="0">
                 <a:solidFill>
@@ -8033,7 +8790,7 @@
                   </a:schemeClr>
                 </a:solidFill>
               </a:rPr>
-              <a:t>Can be created. </a:t>
+              <a:t>    Can be created. </a:t>
             </a:r>
             <a:endParaRPr lang="en-US" sz="2400" dirty="0">
               <a:solidFill>
@@ -8077,6 +8834,48 @@
                 <a:cs typeface="SignPainter-HouseScript"/>
               </a:rPr>
               <a:t>Associate</a:t>
+            </a:r>
+            <a:endParaRPr lang="en-US" sz="5400" dirty="0">
+              <a:solidFill>
+                <a:srgbClr val="331933"/>
+              </a:solidFill>
+              <a:latin typeface="SignPainter-HouseScript"/>
+              <a:cs typeface="SignPainter-HouseScript"/>
+            </a:endParaRPr>
+          </a:p>
+        </p:txBody>
+      </p:sp>
+      <p:sp>
+        <p:nvSpPr>
+          <p:cNvPr id="7" name="TextBox 6"/>
+          <p:cNvSpPr txBox="1"/>
+          <p:nvPr/>
+        </p:nvSpPr>
+        <p:spPr>
+          <a:xfrm>
+            <a:off x="3176711" y="3037217"/>
+            <a:ext cx="4231712" cy="923330"/>
+          </a:xfrm>
+          <a:prstGeom prst="rect">
+            <a:avLst/>
+          </a:prstGeom>
+          <a:noFill/>
+        </p:spPr>
+        <p:txBody>
+          <a:bodyPr wrap="square" rtlCol="0">
+            <a:spAutoFit/>
+          </a:bodyPr>
+          <a:lstStyle/>
+          <a:p>
+            <a:r>
+              <a:rPr lang="en-US" sz="5400" dirty="0" smtClean="0">
+                <a:solidFill>
+                  <a:srgbClr val="331933"/>
+                </a:solidFill>
+                <a:latin typeface="SignPainter-HouseScript"/>
+                <a:cs typeface="SignPainter-HouseScript"/>
+              </a:rPr>
+              <a:t>Routes</a:t>
             </a:r>
             <a:endParaRPr lang="en-US" sz="5400" dirty="0">
               <a:solidFill>
@@ -8276,8 +9075,8 @@
         </p:nvSpPr>
         <p:spPr>
           <a:xfrm>
-            <a:off x="2862530" y="2894368"/>
-            <a:ext cx="6068914" cy="1446550"/>
+            <a:off x="3176710" y="2588435"/>
+            <a:ext cx="5754733" cy="1785104"/>
           </a:xfrm>
           <a:prstGeom prst="rect">
             <a:avLst/>
@@ -8334,6 +9133,15 @@
           </a:p>
           <a:p>
             <a:pPr algn="r"/>
+            <a:endParaRPr lang="en-US" sz="2400" dirty="0" smtClean="0">
+              <a:solidFill>
+                <a:schemeClr val="accent1">
+                  <a:lumMod val="50000"/>
+                </a:schemeClr>
+              </a:solidFill>
+            </a:endParaRPr>
+          </a:p>
+          <a:p>
             <a:r>
               <a:rPr lang="en-US" sz="2400" dirty="0" smtClean="0">
                 <a:solidFill>
@@ -8406,6 +9214,48 @@
                 <a:cs typeface="SignPainter-HouseScript"/>
               </a:rPr>
               <a:t>Associate</a:t>
+            </a:r>
+            <a:endParaRPr lang="en-US" sz="5400" dirty="0">
+              <a:solidFill>
+                <a:srgbClr val="331933"/>
+              </a:solidFill>
+              <a:latin typeface="SignPainter-HouseScript"/>
+              <a:cs typeface="SignPainter-HouseScript"/>
+            </a:endParaRPr>
+          </a:p>
+        </p:txBody>
+      </p:sp>
+      <p:sp>
+        <p:nvSpPr>
+          <p:cNvPr id="7" name="TextBox 6"/>
+          <p:cNvSpPr txBox="1"/>
+          <p:nvPr/>
+        </p:nvSpPr>
+        <p:spPr>
+          <a:xfrm>
+            <a:off x="3176711" y="3037217"/>
+            <a:ext cx="4231712" cy="923330"/>
+          </a:xfrm>
+          <a:prstGeom prst="rect">
+            <a:avLst/>
+          </a:prstGeom>
+          <a:noFill/>
+        </p:spPr>
+        <p:txBody>
+          <a:bodyPr wrap="square" rtlCol="0">
+            <a:spAutoFit/>
+          </a:bodyPr>
+          <a:lstStyle/>
+          <a:p>
+            <a:r>
+              <a:rPr lang="en-US" sz="5400" dirty="0" smtClean="0">
+                <a:solidFill>
+                  <a:srgbClr val="331933"/>
+                </a:solidFill>
+                <a:latin typeface="SignPainter-HouseScript"/>
+                <a:cs typeface="SignPainter-HouseScript"/>
+              </a:rPr>
+              <a:t>Routes</a:t>
             </a:r>
             <a:endParaRPr lang="en-US" sz="5400" dirty="0">
               <a:solidFill>
@@ -8647,8 +9497,8 @@
         </p:nvSpPr>
         <p:spPr>
           <a:xfrm>
-            <a:off x="2862530" y="2894368"/>
-            <a:ext cx="6068914" cy="1446550"/>
+            <a:off x="3176710" y="2537129"/>
+            <a:ext cx="5754733" cy="1785104"/>
           </a:xfrm>
           <a:prstGeom prst="rect">
             <a:avLst/>
@@ -8698,6 +9548,15 @@
           </a:p>
           <a:p>
             <a:pPr algn="r"/>
+            <a:endParaRPr lang="en-US" sz="2400" dirty="0" smtClean="0">
+              <a:solidFill>
+                <a:schemeClr val="accent1">
+                  <a:lumMod val="50000"/>
+                </a:schemeClr>
+              </a:solidFill>
+            </a:endParaRPr>
+          </a:p>
+          <a:p>
             <a:r>
               <a:rPr lang="en-US" sz="2400" dirty="0" smtClean="0">
                 <a:solidFill>
@@ -8750,6 +9609,48 @@
                 <a:cs typeface="SignPainter-HouseScript"/>
               </a:rPr>
               <a:t>Associate</a:t>
+            </a:r>
+            <a:endParaRPr lang="en-US" sz="5400" dirty="0">
+              <a:solidFill>
+                <a:srgbClr val="331933"/>
+              </a:solidFill>
+              <a:latin typeface="SignPainter-HouseScript"/>
+              <a:cs typeface="SignPainter-HouseScript"/>
+            </a:endParaRPr>
+          </a:p>
+        </p:txBody>
+      </p:sp>
+      <p:sp>
+        <p:nvSpPr>
+          <p:cNvPr id="7" name="TextBox 6"/>
+          <p:cNvSpPr txBox="1"/>
+          <p:nvPr/>
+        </p:nvSpPr>
+        <p:spPr>
+          <a:xfrm>
+            <a:off x="3176711" y="3037217"/>
+            <a:ext cx="4231712" cy="923330"/>
+          </a:xfrm>
+          <a:prstGeom prst="rect">
+            <a:avLst/>
+          </a:prstGeom>
+          <a:noFill/>
+        </p:spPr>
+        <p:txBody>
+          <a:bodyPr wrap="square" rtlCol="0">
+            <a:spAutoFit/>
+          </a:bodyPr>
+          <a:lstStyle/>
+          <a:p>
+            <a:r>
+              <a:rPr lang="en-US" sz="5400" dirty="0" smtClean="0">
+                <a:solidFill>
+                  <a:srgbClr val="331933"/>
+                </a:solidFill>
+                <a:latin typeface="SignPainter-HouseScript"/>
+                <a:cs typeface="SignPainter-HouseScript"/>
+              </a:rPr>
+              <a:t>Routes</a:t>
             </a:r>
             <a:endParaRPr lang="en-US" sz="5400" dirty="0">
               <a:solidFill>
@@ -8953,8 +9854,8 @@
         </p:nvSpPr>
         <p:spPr>
           <a:xfrm>
-            <a:off x="2862530" y="2894368"/>
-            <a:ext cx="6068914" cy="1938992"/>
+            <a:off x="3176710" y="2688802"/>
+            <a:ext cx="5754733" cy="2308324"/>
           </a:xfrm>
           <a:prstGeom prst="rect">
             <a:avLst/>
@@ -8978,16 +9879,13 @@
               </a:rPr>
               <a:t>I only exist because everything else exists.</a:t>
             </a:r>
-            <a:r>
-              <a:rPr lang="en-US" sz="1400" dirty="0" smtClean="0">
-                <a:solidFill>
-                  <a:schemeClr val="accent1">
-                    <a:lumMod val="50000"/>
-                  </a:schemeClr>
-                </a:solidFill>
-              </a:rPr>
-              <a:t>)</a:t>
-            </a:r>
+            <a:endParaRPr lang="en-US" sz="1400" dirty="0" smtClean="0">
+              <a:solidFill>
+                <a:schemeClr val="accent1">
+                  <a:lumMod val="50000"/>
+                </a:schemeClr>
+              </a:solidFill>
+            </a:endParaRPr>
           </a:p>
           <a:p>
             <a:pPr algn="r"/>
@@ -9001,6 +9899,15 @@
           </a:p>
           <a:p>
             <a:pPr algn="r"/>
+            <a:endParaRPr lang="en-US" sz="2400" dirty="0" smtClean="0">
+              <a:solidFill>
+                <a:schemeClr val="accent1">
+                  <a:lumMod val="50000"/>
+                </a:schemeClr>
+              </a:solidFill>
+            </a:endParaRPr>
+          </a:p>
+          <a:p>
             <a:r>
               <a:rPr lang="en-US" sz="2400" dirty="0" smtClean="0">
                 <a:solidFill>
@@ -9013,7 +9920,6 @@
             </a:r>
           </a:p>
           <a:p>
-            <a:pPr algn="r"/>
             <a:r>
               <a:rPr lang="en-US" sz="2400" dirty="0" smtClean="0">
                 <a:solidFill>
@@ -9096,36 +10002,48 @@
           </a:p>
         </p:txBody>
       </p:sp>
-      <p:pic>
-        <p:nvPicPr>
-          <p:cNvPr id="2" name="Picture 1" descr="download.jpg"/>
-          <p:cNvPicPr>
-            <a:picLocks noChangeAspect="1"/>
-          </p:cNvPicPr>
+      <p:sp>
+        <p:nvSpPr>
+          <p:cNvPr id="8" name="TextBox 7"/>
+          <p:cNvSpPr txBox="1"/>
           <p:nvPr/>
-        </p:nvPicPr>
-        <p:blipFill>
-          <a:blip r:embed="rId3">
-            <a:extLst>
-              <a:ext uri="{28A0092B-C50C-407E-A947-70E740481C1C}">
-                <a14:useLocalDpi xmlns:a14="http://schemas.microsoft.com/office/drawing/2010/main" val="0"/>
-              </a:ext>
-            </a:extLst>
-          </a:blip>
-          <a:stretch>
-            <a:fillRect/>
-          </a:stretch>
-        </p:blipFill>
+        </p:nvSpPr>
         <p:spPr>
           <a:xfrm>
-            <a:off x="5497326" y="1487714"/>
-            <a:ext cx="3434118" cy="3434118"/>
+            <a:off x="3176711" y="3037217"/>
+            <a:ext cx="4231712" cy="923330"/>
           </a:xfrm>
           <a:prstGeom prst="rect">
             <a:avLst/>
           </a:prstGeom>
-        </p:spPr>
-      </p:pic>
+          <a:noFill/>
+        </p:spPr>
+        <p:txBody>
+          <a:bodyPr wrap="square" rtlCol="0">
+            <a:spAutoFit/>
+          </a:bodyPr>
+          <a:lstStyle/>
+          <a:p>
+            <a:r>
+              <a:rPr lang="en-US" sz="5400" dirty="0" smtClean="0">
+                <a:solidFill>
+                  <a:srgbClr val="331933"/>
+                </a:solidFill>
+                <a:latin typeface="SignPainter-HouseScript"/>
+                <a:cs typeface="SignPainter-HouseScript"/>
+              </a:rPr>
+              <a:t>Routes</a:t>
+            </a:r>
+            <a:endParaRPr lang="en-US" sz="5400" dirty="0">
+              <a:solidFill>
+                <a:srgbClr val="331933"/>
+              </a:solidFill>
+              <a:latin typeface="SignPainter-HouseScript"/>
+              <a:cs typeface="SignPainter-HouseScript"/>
+            </a:endParaRPr>
+          </a:p>
+        </p:txBody>
+      </p:sp>
     </p:spTree>
     <p:extLst>
       <p:ext uri="{BB962C8B-B14F-4D97-AF65-F5344CB8AC3E}">
@@ -9139,75 +10057,7 @@
   <p:timing>
     <p:tnLst>
       <p:par>
-        <p:cTn xmlns:p14="http://schemas.microsoft.com/office/powerpoint/2010/main" id="1" dur="indefinite" restart="never" nodeType="tmRoot">
-          <p:childTnLst>
-            <p:seq concurrent="1" nextAc="seek">
-              <p:cTn id="2" dur="indefinite" nodeType="mainSeq">
-                <p:childTnLst>
-                  <p:par>
-                    <p:cTn id="3" fill="hold">
-                      <p:stCondLst>
-                        <p:cond delay="indefinite"/>
-                      </p:stCondLst>
-                      <p:childTnLst>
-                        <p:par>
-                          <p:cTn id="4" fill="hold">
-                            <p:stCondLst>
-                              <p:cond delay="0"/>
-                            </p:stCondLst>
-                            <p:childTnLst>
-                              <p:par>
-                                <p:cTn id="5" presetID="1" presetClass="entr" presetSubtype="0" fill="hold" nodeType="clickEffect">
-                                  <p:stCondLst>
-                                    <p:cond delay="0"/>
-                                  </p:stCondLst>
-                                  <p:childTnLst>
-                                    <p:set>
-                                      <p:cBhvr>
-                                        <p:cTn id="6" dur="1" fill="hold">
-                                          <p:stCondLst>
-                                            <p:cond delay="0"/>
-                                          </p:stCondLst>
-                                        </p:cTn>
-                                        <p:tgtEl>
-                                          <p:spTgt spid="2"/>
-                                        </p:tgtEl>
-                                        <p:attrNameLst>
-                                          <p:attrName>style.visibility</p:attrName>
-                                        </p:attrNameLst>
-                                      </p:cBhvr>
-                                      <p:to>
-                                        <p:strVal val="visible"/>
-                                      </p:to>
-                                    </p:set>
-                                  </p:childTnLst>
-                                </p:cTn>
-                              </p:par>
-                            </p:childTnLst>
-                          </p:cTn>
-                        </p:par>
-                      </p:childTnLst>
-                    </p:cTn>
-                  </p:par>
-                </p:childTnLst>
-              </p:cTn>
-              <p:prevCondLst>
-                <p:cond evt="onPrev" delay="0">
-                  <p:tgtEl>
-                    <p:sldTgt/>
-                  </p:tgtEl>
-                </p:cond>
-              </p:prevCondLst>
-              <p:nextCondLst>
-                <p:cond evt="onNext" delay="0">
-                  <p:tgtEl>
-                    <p:sldTgt/>
-                  </p:tgtEl>
-                </p:cond>
-              </p:nextCondLst>
-            </p:seq>
-          </p:childTnLst>
-        </p:cTn>
+        <p:cTn xmlns:p14="http://schemas.microsoft.com/office/powerpoint/2010/main" id="1" dur="indefinite" restart="never" nodeType="tmRoot"/>
       </p:par>
     </p:tnLst>
   </p:timing>

</xml_diff>

<commit_message>
changes to style.css, signup.js (spirit animals) and the suitcase frame in images
</commit_message>
<xml_diff>
--- a/app/public/assets/img/WanderMust_Presentation.pptx
+++ b/app/public/assets/img/WanderMust_Presentation.pptx
@@ -6507,49 +6507,6 @@
       </p:pic>
       <p:sp>
         <p:nvSpPr>
-          <p:cNvPr id="5" name="Text Placeholder 4"/>
-          <p:cNvSpPr>
-            <a:spLocks noGrp="1"/>
-          </p:cNvSpPr>
-          <p:nvPr>
-            <p:ph type="body" sz="quarter" idx="3"/>
-          </p:nvPr>
-        </p:nvSpPr>
-        <p:spPr/>
-        <p:txBody>
-          <a:bodyPr/>
-          <a:lstStyle/>
-          <a:p>
-            <a:endParaRPr lang="en-US"/>
-          </a:p>
-        </p:txBody>
-      </p:sp>
-      <p:sp>
-        <p:nvSpPr>
-          <p:cNvPr id="6" name="Content Placeholder 5"/>
-          <p:cNvSpPr>
-            <a:spLocks noGrp="1"/>
-          </p:cNvSpPr>
-          <p:nvPr>
-            <p:ph sz="quarter" idx="4"/>
-          </p:nvPr>
-        </p:nvSpPr>
-        <p:spPr>
-          <a:xfrm>
-            <a:off x="4700016" y="1276386"/>
-            <a:ext cx="3200400" cy="871069"/>
-          </a:xfrm>
-        </p:spPr>
-        <p:txBody>
-          <a:bodyPr/>
-          <a:lstStyle/>
-          <a:p>
-            <a:endParaRPr lang="en-US" dirty="0"/>
-          </a:p>
-        </p:txBody>
-      </p:sp>
-      <p:sp>
-        <p:nvSpPr>
           <p:cNvPr id="9" name="Content Placeholder 5"/>
           <p:cNvSpPr txBox="1">
             <a:spLocks/>
@@ -6735,6 +6692,36 @@
           </a:p>
         </p:txBody>
       </p:sp>
+      <p:pic>
+        <p:nvPicPr>
+          <p:cNvPr id="10" name="Picture 9" descr="omg-a-passport.jpg"/>
+          <p:cNvPicPr>
+            <a:picLocks noChangeAspect="1"/>
+          </p:cNvPicPr>
+          <p:nvPr/>
+        </p:nvPicPr>
+        <p:blipFill>
+          <a:blip r:embed="rId3">
+            <a:extLst>
+              <a:ext uri="{28A0092B-C50C-407E-A947-70E740481C1C}">
+                <a14:useLocalDpi xmlns:a14="http://schemas.microsoft.com/office/drawing/2010/main" val="0"/>
+              </a:ext>
+            </a:extLst>
+          </a:blip>
+          <a:stretch>
+            <a:fillRect/>
+          </a:stretch>
+        </p:blipFill>
+        <p:spPr>
+          <a:xfrm>
+            <a:off x="4019550" y="1028196"/>
+            <a:ext cx="4826836" cy="3649088"/>
+          </a:xfrm>
+          <a:prstGeom prst="rect">
+            <a:avLst/>
+          </a:prstGeom>
+        </p:spPr>
+      </p:pic>
     </p:spTree>
     <p:extLst>
       <p:ext uri="{BB962C8B-B14F-4D97-AF65-F5344CB8AC3E}">

</xml_diff>